<commit_message>
search null bug solved
</commit_message>
<xml_diff>
--- a/Info.pptx
+++ b/Info.pptx
@@ -3397,6 +3397,10 @@
             <a:br>
               <a:rPr lang="en-US" dirty="0" smtClean="0"/>
             </a:br>
+            <a:r>
+              <a:rPr lang="en-US" dirty="0" smtClean="0"/>
+              <a:t>Pre injected Services </a:t>
+            </a:r>
             <a:r>
               <a:rPr lang="en-US" sz="3600" dirty="0" smtClean="0"/>
               <a:t>@inject </a:t>

</xml_diff>

<commit_message>
Revert "Sort Functionality Improved"
This reverts commit b761d2e59b65c2ba6a651d229a02a0dbdd74f00f.
</commit_message>
<xml_diff>
--- a/Info.pptx
+++ b/Info.pptx
@@ -290,7 +290,7 @@
           <a:p>
             <a:fld id="{FBBC2F48-E3B2-445D-AB9D-2D3155CB246B}" type="datetimeFigureOut">
               <a:rPr lang="de-DE" smtClean="0"/>
-              <a:t>13.01.2025</a:t>
+              <a:t>10.01.2025</a:t>
             </a:fld>
             <a:endParaRPr lang="de-DE"/>
           </a:p>
@@ -460,7 +460,7 @@
           <a:p>
             <a:fld id="{FBBC2F48-E3B2-445D-AB9D-2D3155CB246B}" type="datetimeFigureOut">
               <a:rPr lang="de-DE" smtClean="0"/>
-              <a:t>13.01.2025</a:t>
+              <a:t>10.01.2025</a:t>
             </a:fld>
             <a:endParaRPr lang="de-DE"/>
           </a:p>
@@ -640,7 +640,7 @@
           <a:p>
             <a:fld id="{FBBC2F48-E3B2-445D-AB9D-2D3155CB246B}" type="datetimeFigureOut">
               <a:rPr lang="de-DE" smtClean="0"/>
-              <a:t>13.01.2025</a:t>
+              <a:t>10.01.2025</a:t>
             </a:fld>
             <a:endParaRPr lang="de-DE"/>
           </a:p>
@@ -810,7 +810,7 @@
           <a:p>
             <a:fld id="{FBBC2F48-E3B2-445D-AB9D-2D3155CB246B}" type="datetimeFigureOut">
               <a:rPr lang="de-DE" smtClean="0"/>
-              <a:t>13.01.2025</a:t>
+              <a:t>10.01.2025</a:t>
             </a:fld>
             <a:endParaRPr lang="de-DE"/>
           </a:p>
@@ -1056,7 +1056,7 @@
           <a:p>
             <a:fld id="{FBBC2F48-E3B2-445D-AB9D-2D3155CB246B}" type="datetimeFigureOut">
               <a:rPr lang="de-DE" smtClean="0"/>
-              <a:t>13.01.2025</a:t>
+              <a:t>10.01.2025</a:t>
             </a:fld>
             <a:endParaRPr lang="de-DE"/>
           </a:p>
@@ -1344,7 +1344,7 @@
           <a:p>
             <a:fld id="{FBBC2F48-E3B2-445D-AB9D-2D3155CB246B}" type="datetimeFigureOut">
               <a:rPr lang="de-DE" smtClean="0"/>
-              <a:t>13.01.2025</a:t>
+              <a:t>10.01.2025</a:t>
             </a:fld>
             <a:endParaRPr lang="de-DE"/>
           </a:p>
@@ -1766,7 +1766,7 @@
           <a:p>
             <a:fld id="{FBBC2F48-E3B2-445D-AB9D-2D3155CB246B}" type="datetimeFigureOut">
               <a:rPr lang="de-DE" smtClean="0"/>
-              <a:t>13.01.2025</a:t>
+              <a:t>10.01.2025</a:t>
             </a:fld>
             <a:endParaRPr lang="de-DE"/>
           </a:p>
@@ -1884,7 +1884,7 @@
           <a:p>
             <a:fld id="{FBBC2F48-E3B2-445D-AB9D-2D3155CB246B}" type="datetimeFigureOut">
               <a:rPr lang="de-DE" smtClean="0"/>
-              <a:t>13.01.2025</a:t>
+              <a:t>10.01.2025</a:t>
             </a:fld>
             <a:endParaRPr lang="de-DE"/>
           </a:p>
@@ -1979,7 +1979,7 @@
           <a:p>
             <a:fld id="{FBBC2F48-E3B2-445D-AB9D-2D3155CB246B}" type="datetimeFigureOut">
               <a:rPr lang="de-DE" smtClean="0"/>
-              <a:t>13.01.2025</a:t>
+              <a:t>10.01.2025</a:t>
             </a:fld>
             <a:endParaRPr lang="de-DE"/>
           </a:p>
@@ -2256,7 +2256,7 @@
           <a:p>
             <a:fld id="{FBBC2F48-E3B2-445D-AB9D-2D3155CB246B}" type="datetimeFigureOut">
               <a:rPr lang="de-DE" smtClean="0"/>
-              <a:t>13.01.2025</a:t>
+              <a:t>10.01.2025</a:t>
             </a:fld>
             <a:endParaRPr lang="de-DE"/>
           </a:p>
@@ -2509,7 +2509,7 @@
           <a:p>
             <a:fld id="{FBBC2F48-E3B2-445D-AB9D-2D3155CB246B}" type="datetimeFigureOut">
               <a:rPr lang="de-DE" smtClean="0"/>
-              <a:t>13.01.2025</a:t>
+              <a:t>10.01.2025</a:t>
             </a:fld>
             <a:endParaRPr lang="de-DE"/>
           </a:p>
@@ -2722,7 +2722,7 @@
           <a:p>
             <a:fld id="{FBBC2F48-E3B2-445D-AB9D-2D3155CB246B}" type="datetimeFigureOut">
               <a:rPr lang="de-DE" smtClean="0"/>
-              <a:t>13.01.2025</a:t>
+              <a:t>10.01.2025</a:t>
             </a:fld>
             <a:endParaRPr lang="de-DE"/>
           </a:p>
@@ -3385,52 +3385,25 @@
             </a:br>
             <a:r>
               <a:rPr lang="en-US" dirty="0" smtClean="0"/>
-              <a:t>Static Class </a:t>
-            </a:r>
-            <a:r>
-              <a:rPr lang="en-US" dirty="0" smtClean="0"/>
-              <a:t/>
+              <a:t>Static Class static constructor </a:t>
             </a:r>
             <a:br>
               <a:rPr lang="en-US" dirty="0" smtClean="0"/>
             </a:br>
             <a:r>
               <a:rPr lang="en-US" dirty="0" smtClean="0"/>
-              <a:t>Static </a:t>
-            </a:r>
-            <a:r>
-              <a:rPr lang="en-US" dirty="0"/>
-              <a:t>C</a:t>
-            </a:r>
-            <a:r>
-              <a:rPr lang="en-US" dirty="0" smtClean="0"/>
-              <a:t>onstructor</a:t>
-            </a:r>
-            <a:r>
-              <a:rPr lang="en-US" dirty="0" smtClean="0"/>
-              <a:t/>
+              <a:t>Static Constructor</a:t>
             </a:r>
             <a:br>
               <a:rPr lang="en-US" dirty="0" smtClean="0"/>
             </a:br>
             <a:r>
               <a:rPr lang="en-US" dirty="0" smtClean="0"/>
-              <a:t>Pre </a:t>
-            </a:r>
-            <a:r>
-              <a:rPr lang="en-US" dirty="0" smtClean="0"/>
-              <a:t>Registered Services </a:t>
-            </a:r>
-            <a:br>
-              <a:rPr lang="en-US" dirty="0" smtClean="0"/>
-            </a:br>
+              <a:t>Pre injected Services </a:t>
+            </a:r>
             <a:r>
               <a:rPr lang="en-US" sz="3600" dirty="0" smtClean="0"/>
-              <a:t>@</a:t>
-            </a:r>
-            <a:r>
-              <a:rPr lang="en-US" sz="3600" dirty="0" smtClean="0"/>
-              <a:t>inject </a:t>
+              <a:t>@inject </a:t>
             </a:r>
             <a:r>
               <a:rPr lang="en-US" sz="3600" dirty="0" err="1" smtClean="0"/>

</xml_diff>

<commit_message>
Reapply "Sort Functionality Improved"
This reverts commit 460d49549ebceda90f53e31804cc241e73620df9.
</commit_message>
<xml_diff>
--- a/Info.pptx
+++ b/Info.pptx
@@ -290,7 +290,7 @@
           <a:p>
             <a:fld id="{FBBC2F48-E3B2-445D-AB9D-2D3155CB246B}" type="datetimeFigureOut">
               <a:rPr lang="de-DE" smtClean="0"/>
-              <a:t>10.01.2025</a:t>
+              <a:t>13.01.2025</a:t>
             </a:fld>
             <a:endParaRPr lang="de-DE"/>
           </a:p>
@@ -460,7 +460,7 @@
           <a:p>
             <a:fld id="{FBBC2F48-E3B2-445D-AB9D-2D3155CB246B}" type="datetimeFigureOut">
               <a:rPr lang="de-DE" smtClean="0"/>
-              <a:t>10.01.2025</a:t>
+              <a:t>13.01.2025</a:t>
             </a:fld>
             <a:endParaRPr lang="de-DE"/>
           </a:p>
@@ -640,7 +640,7 @@
           <a:p>
             <a:fld id="{FBBC2F48-E3B2-445D-AB9D-2D3155CB246B}" type="datetimeFigureOut">
               <a:rPr lang="de-DE" smtClean="0"/>
-              <a:t>10.01.2025</a:t>
+              <a:t>13.01.2025</a:t>
             </a:fld>
             <a:endParaRPr lang="de-DE"/>
           </a:p>
@@ -810,7 +810,7 @@
           <a:p>
             <a:fld id="{FBBC2F48-E3B2-445D-AB9D-2D3155CB246B}" type="datetimeFigureOut">
               <a:rPr lang="de-DE" smtClean="0"/>
-              <a:t>10.01.2025</a:t>
+              <a:t>13.01.2025</a:t>
             </a:fld>
             <a:endParaRPr lang="de-DE"/>
           </a:p>
@@ -1056,7 +1056,7 @@
           <a:p>
             <a:fld id="{FBBC2F48-E3B2-445D-AB9D-2D3155CB246B}" type="datetimeFigureOut">
               <a:rPr lang="de-DE" smtClean="0"/>
-              <a:t>10.01.2025</a:t>
+              <a:t>13.01.2025</a:t>
             </a:fld>
             <a:endParaRPr lang="de-DE"/>
           </a:p>
@@ -1344,7 +1344,7 @@
           <a:p>
             <a:fld id="{FBBC2F48-E3B2-445D-AB9D-2D3155CB246B}" type="datetimeFigureOut">
               <a:rPr lang="de-DE" smtClean="0"/>
-              <a:t>10.01.2025</a:t>
+              <a:t>13.01.2025</a:t>
             </a:fld>
             <a:endParaRPr lang="de-DE"/>
           </a:p>
@@ -1766,7 +1766,7 @@
           <a:p>
             <a:fld id="{FBBC2F48-E3B2-445D-AB9D-2D3155CB246B}" type="datetimeFigureOut">
               <a:rPr lang="de-DE" smtClean="0"/>
-              <a:t>10.01.2025</a:t>
+              <a:t>13.01.2025</a:t>
             </a:fld>
             <a:endParaRPr lang="de-DE"/>
           </a:p>
@@ -1884,7 +1884,7 @@
           <a:p>
             <a:fld id="{FBBC2F48-E3B2-445D-AB9D-2D3155CB246B}" type="datetimeFigureOut">
               <a:rPr lang="de-DE" smtClean="0"/>
-              <a:t>10.01.2025</a:t>
+              <a:t>13.01.2025</a:t>
             </a:fld>
             <a:endParaRPr lang="de-DE"/>
           </a:p>
@@ -1979,7 +1979,7 @@
           <a:p>
             <a:fld id="{FBBC2F48-E3B2-445D-AB9D-2D3155CB246B}" type="datetimeFigureOut">
               <a:rPr lang="de-DE" smtClean="0"/>
-              <a:t>10.01.2025</a:t>
+              <a:t>13.01.2025</a:t>
             </a:fld>
             <a:endParaRPr lang="de-DE"/>
           </a:p>
@@ -2256,7 +2256,7 @@
           <a:p>
             <a:fld id="{FBBC2F48-E3B2-445D-AB9D-2D3155CB246B}" type="datetimeFigureOut">
               <a:rPr lang="de-DE" smtClean="0"/>
-              <a:t>10.01.2025</a:t>
+              <a:t>13.01.2025</a:t>
             </a:fld>
             <a:endParaRPr lang="de-DE"/>
           </a:p>
@@ -2509,7 +2509,7 @@
           <a:p>
             <a:fld id="{FBBC2F48-E3B2-445D-AB9D-2D3155CB246B}" type="datetimeFigureOut">
               <a:rPr lang="de-DE" smtClean="0"/>
-              <a:t>10.01.2025</a:t>
+              <a:t>13.01.2025</a:t>
             </a:fld>
             <a:endParaRPr lang="de-DE"/>
           </a:p>
@@ -2722,7 +2722,7 @@
           <a:p>
             <a:fld id="{FBBC2F48-E3B2-445D-AB9D-2D3155CB246B}" type="datetimeFigureOut">
               <a:rPr lang="de-DE" smtClean="0"/>
-              <a:t>10.01.2025</a:t>
+              <a:t>13.01.2025</a:t>
             </a:fld>
             <a:endParaRPr lang="de-DE"/>
           </a:p>
@@ -3385,25 +3385,52 @@
             </a:br>
             <a:r>
               <a:rPr lang="en-US" dirty="0" smtClean="0"/>
-              <a:t>Static Class static constructor </a:t>
+              <a:t>Static Class </a:t>
+            </a:r>
+            <a:r>
+              <a:rPr lang="en-US" dirty="0" smtClean="0"/>
+              <a:t/>
             </a:r>
             <a:br>
               <a:rPr lang="en-US" dirty="0" smtClean="0"/>
             </a:br>
             <a:r>
               <a:rPr lang="en-US" dirty="0" smtClean="0"/>
-              <a:t>Static Constructor</a:t>
+              <a:t>Static </a:t>
+            </a:r>
+            <a:r>
+              <a:rPr lang="en-US" dirty="0"/>
+              <a:t>C</a:t>
+            </a:r>
+            <a:r>
+              <a:rPr lang="en-US" dirty="0" smtClean="0"/>
+              <a:t>onstructor</a:t>
+            </a:r>
+            <a:r>
+              <a:rPr lang="en-US" dirty="0" smtClean="0"/>
+              <a:t/>
             </a:r>
             <a:br>
               <a:rPr lang="en-US" dirty="0" smtClean="0"/>
             </a:br>
             <a:r>
               <a:rPr lang="en-US" dirty="0" smtClean="0"/>
-              <a:t>Pre injected Services </a:t>
-            </a:r>
+              <a:t>Pre </a:t>
+            </a:r>
+            <a:r>
+              <a:rPr lang="en-US" dirty="0" smtClean="0"/>
+              <a:t>Registered Services </a:t>
+            </a:r>
+            <a:br>
+              <a:rPr lang="en-US" dirty="0" smtClean="0"/>
+            </a:br>
             <a:r>
               <a:rPr lang="en-US" sz="3600" dirty="0" smtClean="0"/>
-              <a:t>@inject </a:t>
+              <a:t>@</a:t>
+            </a:r>
+            <a:r>
+              <a:rPr lang="en-US" sz="3600" dirty="0" smtClean="0"/>
+              <a:t>inject </a:t>
             </a:r>
             <a:r>
               <a:rPr lang="en-US" sz="3600" dirty="0" err="1" smtClean="0"/>

</xml_diff>